<commit_message>
Finalized on introduction chapter presentation
</commit_message>
<xml_diff>
--- a/Presentations/Senior Seminar 'Introduction' Chapter Presentation.pptx
+++ b/Presentations/Senior Seminar 'Introduction' Chapter Presentation.pptx
@@ -104,6 +104,11 @@
       </a:defRPr>
     </a:lvl9pPr>
   </p:defaultTextStyle>
+  <p:extLst>
+    <p:ext uri="{EFAFB233-063F-42B5-8137-9DF3F51BA10A}">
+      <p15:sldGuideLst xmlns:p15="http://schemas.microsoft.com/office/powerpoint/2012/main"/>
+    </p:ext>
+  </p:extLst>
 </p:presentation>
 </file>
 
@@ -3702,37 +3707,6 @@
           </a:p>
         </p:txBody>
       </p:sp>
-      <p:pic>
-        <p:nvPicPr>
-          <p:cNvPr id="4" name="Picture 3" descr="A marble with brown and aqua colors">
-            <a:extLst>
-              <a:ext uri="{FF2B5EF4-FFF2-40B4-BE49-F238E27FC236}">
-                <a16:creationId xmlns:a16="http://schemas.microsoft.com/office/drawing/2014/main" id="{BAECFD4B-2329-9308-AF88-94FFC600634F}"/>
-              </a:ext>
-            </a:extLst>
-          </p:cNvPr>
-          <p:cNvPicPr>
-            <a:picLocks noChangeAspect="1"/>
-          </p:cNvPicPr>
-          <p:nvPr/>
-        </p:nvPicPr>
-        <p:blipFill rotWithShape="1">
-          <a:blip r:embed="rId3">
-            <a:alphaModFix amt="84000"/>
-          </a:blip>
-          <a:srcRect t="4492" b="16283"/>
-          <a:stretch/>
-        </p:blipFill>
-        <p:spPr>
-          <a:xfrm>
-            <a:off x="20" y="10"/>
-            <a:ext cx="12191980" cy="6857990"/>
-          </a:xfrm>
-          <a:prstGeom prst="rect">
-            <a:avLst/>
-          </a:prstGeom>
-        </p:spPr>
-      </p:pic>
       <p:sp>
         <p:nvSpPr>
           <p:cNvPr id="13" name="Rectangle 12">
@@ -3810,76 +3784,6 @@
           <a:lstStyle/>
           <a:p>
             <a:pPr algn="ctr"/>
-            <a:endParaRPr lang="en-US">
-              <a:solidFill>
-                <a:srgbClr val="FFFFFF"/>
-              </a:solidFill>
-            </a:endParaRPr>
-          </a:p>
-        </p:txBody>
-      </p:sp>
-      <p:sp>
-        <p:nvSpPr>
-          <p:cNvPr id="2" name="Title 1">
-            <a:extLst>
-              <a:ext uri="{FF2B5EF4-FFF2-40B4-BE49-F238E27FC236}">
-                <a16:creationId xmlns:a16="http://schemas.microsoft.com/office/drawing/2014/main" id="{260320CB-14F7-FFA9-A4FA-52504BDFFA95}"/>
-              </a:ext>
-            </a:extLst>
-          </p:cNvPr>
-          <p:cNvSpPr>
-            <a:spLocks noGrp="1"/>
-          </p:cNvSpPr>
-          <p:nvPr>
-            <p:ph type="ctrTitle"/>
-          </p:nvPr>
-        </p:nvSpPr>
-        <p:spPr>
-          <a:xfrm>
-            <a:off x="3805267" y="3153104"/>
-            <a:ext cx="7700933" cy="3019095"/>
-          </a:xfrm>
-        </p:spPr>
-        <p:txBody>
-          <a:bodyPr anchor="b">
-            <a:normAutofit/>
-          </a:bodyPr>
-          <a:lstStyle/>
-          <a:p>
-            <a:pPr algn="r"/>
-            <a:endParaRPr lang="en-US" sz="6600"/>
-          </a:p>
-        </p:txBody>
-      </p:sp>
-      <p:sp>
-        <p:nvSpPr>
-          <p:cNvPr id="3" name="Subtitle 2">
-            <a:extLst>
-              <a:ext uri="{FF2B5EF4-FFF2-40B4-BE49-F238E27FC236}">
-                <a16:creationId xmlns:a16="http://schemas.microsoft.com/office/drawing/2014/main" id="{4FCA22DC-796C-73E0-FB14-C5CA605B70C9}"/>
-              </a:ext>
-            </a:extLst>
-          </p:cNvPr>
-          <p:cNvSpPr>
-            <a:spLocks noGrp="1"/>
-          </p:cNvSpPr>
-          <p:nvPr>
-            <p:ph type="subTitle" idx="1"/>
-          </p:nvPr>
-        </p:nvSpPr>
-        <p:spPr>
-          <a:xfrm>
-            <a:off x="7620000" y="1034218"/>
-            <a:ext cx="3886200" cy="1084668"/>
-          </a:xfrm>
-        </p:spPr>
-        <p:txBody>
-          <a:bodyPr>
-            <a:normAutofit/>
-          </a:bodyPr>
-          <a:lstStyle/>
-          <a:p>
-            <a:pPr algn="r"/>
             <a:endParaRPr lang="en-US">
               <a:solidFill>
                 <a:srgbClr val="FFFFFF"/>
@@ -4115,6 +4019,609 @@
           </p:txBody>
         </p:sp>
       </p:grpSp>
+      <p:sp>
+        <p:nvSpPr>
+          <p:cNvPr id="6" name="TextBox 5">
+            <a:extLst>
+              <a:ext uri="{FF2B5EF4-FFF2-40B4-BE49-F238E27FC236}">
+                <a16:creationId xmlns:a16="http://schemas.microsoft.com/office/drawing/2014/main" id="{D2D6817F-6A01-BB07-0C68-0CF4C8E20491}"/>
+              </a:ext>
+            </a:extLst>
+          </p:cNvPr>
+          <p:cNvSpPr txBox="1"/>
+          <p:nvPr/>
+        </p:nvSpPr>
+        <p:spPr>
+          <a:xfrm>
+            <a:off x="3239857" y="153584"/>
+            <a:ext cx="2856143" cy="369332"/>
+          </a:xfrm>
+          <a:prstGeom prst="rect">
+            <a:avLst/>
+          </a:prstGeom>
+          <a:noFill/>
+        </p:spPr>
+        <p:txBody>
+          <a:bodyPr wrap="square" rtlCol="0">
+            <a:spAutoFit/>
+          </a:bodyPr>
+          <a:lstStyle/>
+          <a:p>
+            <a:r>
+              <a:rPr lang="en-US" b="1" dirty="0">
+                <a:solidFill>
+                  <a:srgbClr val="FFFF00"/>
+                </a:solidFill>
+              </a:rPr>
+              <a:t>ACs ON THE RISE</a:t>
+            </a:r>
+          </a:p>
+        </p:txBody>
+      </p:sp>
+      <p:sp>
+        <p:nvSpPr>
+          <p:cNvPr id="7" name="TextBox 6">
+            <a:extLst>
+              <a:ext uri="{FF2B5EF4-FFF2-40B4-BE49-F238E27FC236}">
+                <a16:creationId xmlns:a16="http://schemas.microsoft.com/office/drawing/2014/main" id="{5F7D1338-3BB5-E164-2D49-0CFA25CCB243}"/>
+              </a:ext>
+            </a:extLst>
+          </p:cNvPr>
+          <p:cNvSpPr txBox="1"/>
+          <p:nvPr/>
+        </p:nvSpPr>
+        <p:spPr>
+          <a:xfrm>
+            <a:off x="42296" y="518361"/>
+            <a:ext cx="2986775" cy="1477328"/>
+          </a:xfrm>
+          <a:prstGeom prst="rect">
+            <a:avLst/>
+          </a:prstGeom>
+          <a:noFill/>
+        </p:spPr>
+        <p:txBody>
+          <a:bodyPr wrap="square" rtlCol="0">
+            <a:spAutoFit/>
+          </a:bodyPr>
+          <a:lstStyle/>
+          <a:p>
+            <a:r>
+              <a:rPr lang="en-US" dirty="0">
+                <a:solidFill>
+                  <a:schemeClr val="bg1"/>
+                </a:solidFill>
+              </a:rPr>
+              <a:t>Cooling has become more critical to humans due to global warming, rapid</a:t>
+            </a:r>
+            <a:br>
+              <a:rPr lang="en-US" dirty="0">
+                <a:solidFill>
+                  <a:schemeClr val="bg1"/>
+                </a:solidFill>
+              </a:rPr>
+            </a:br>
+            <a:r>
+              <a:rPr lang="en-US" dirty="0">
+                <a:solidFill>
+                  <a:schemeClr val="bg1"/>
+                </a:solidFill>
+              </a:rPr>
+              <a:t>population growth and industrial development.</a:t>
+            </a:r>
+          </a:p>
+        </p:txBody>
+      </p:sp>
+      <p:pic>
+        <p:nvPicPr>
+          <p:cNvPr id="10" name="Picture 9" descr="A group of children playing in a water fountain&#10;&#10;Description automatically generated">
+            <a:extLst>
+              <a:ext uri="{FF2B5EF4-FFF2-40B4-BE49-F238E27FC236}">
+                <a16:creationId xmlns:a16="http://schemas.microsoft.com/office/drawing/2014/main" id="{797D3417-C753-A4F7-A0A4-3626D81EC2F2}"/>
+              </a:ext>
+            </a:extLst>
+          </p:cNvPr>
+          <p:cNvPicPr>
+            <a:picLocks noChangeAspect="1"/>
+          </p:cNvPicPr>
+          <p:nvPr/>
+        </p:nvPicPr>
+        <p:blipFill>
+          <a:blip r:embed="rId3"/>
+          <a:stretch>
+            <a:fillRect/>
+          </a:stretch>
+        </p:blipFill>
+        <p:spPr>
+          <a:xfrm>
+            <a:off x="108065" y="2272687"/>
+            <a:ext cx="3359410" cy="2230858"/>
+          </a:xfrm>
+          <a:prstGeom prst="rect">
+            <a:avLst/>
+          </a:prstGeom>
+        </p:spPr>
+      </p:pic>
+      <p:sp>
+        <p:nvSpPr>
+          <p:cNvPr id="12" name="TextBox 11">
+            <a:extLst>
+              <a:ext uri="{FF2B5EF4-FFF2-40B4-BE49-F238E27FC236}">
+                <a16:creationId xmlns:a16="http://schemas.microsoft.com/office/drawing/2014/main" id="{77439701-7653-CFD5-DF1B-F5C6E4B65CC3}"/>
+              </a:ext>
+            </a:extLst>
+          </p:cNvPr>
+          <p:cNvSpPr txBox="1"/>
+          <p:nvPr/>
+        </p:nvSpPr>
+        <p:spPr>
+          <a:xfrm>
+            <a:off x="42296" y="207559"/>
+            <a:ext cx="3061726" cy="369332"/>
+          </a:xfrm>
+          <a:prstGeom prst="rect">
+            <a:avLst/>
+          </a:prstGeom>
+          <a:noFill/>
+        </p:spPr>
+        <p:txBody>
+          <a:bodyPr wrap="square" rtlCol="0">
+            <a:spAutoFit/>
+          </a:bodyPr>
+          <a:lstStyle/>
+          <a:p>
+            <a:r>
+              <a:rPr lang="en-US" b="1" dirty="0">
+                <a:solidFill>
+                  <a:srgbClr val="FFFF00"/>
+                </a:solidFill>
+              </a:rPr>
+              <a:t>COOLING IS CRITICAL</a:t>
+            </a:r>
+          </a:p>
+        </p:txBody>
+      </p:sp>
+      <p:sp>
+        <p:nvSpPr>
+          <p:cNvPr id="14" name="TextBox 13">
+            <a:extLst>
+              <a:ext uri="{FF2B5EF4-FFF2-40B4-BE49-F238E27FC236}">
+                <a16:creationId xmlns:a16="http://schemas.microsoft.com/office/drawing/2014/main" id="{4216B142-F2A8-113B-2AD3-07354F4FDC66}"/>
+              </a:ext>
+            </a:extLst>
+          </p:cNvPr>
+          <p:cNvSpPr txBox="1"/>
+          <p:nvPr/>
+        </p:nvSpPr>
+        <p:spPr>
+          <a:xfrm>
+            <a:off x="3250880" y="439547"/>
+            <a:ext cx="2986775" cy="1200329"/>
+          </a:xfrm>
+          <a:prstGeom prst="rect">
+            <a:avLst/>
+          </a:prstGeom>
+          <a:noFill/>
+        </p:spPr>
+        <p:txBody>
+          <a:bodyPr wrap="square" rtlCol="0">
+            <a:spAutoFit/>
+          </a:bodyPr>
+          <a:lstStyle/>
+          <a:p>
+            <a:r>
+              <a:rPr lang="en-US" dirty="0">
+                <a:solidFill>
+                  <a:schemeClr val="bg1"/>
+                </a:solidFill>
+              </a:rPr>
+              <a:t>From 1990 to 2016, annual AC sales experienced a nearly fourfold increase,</a:t>
+            </a:r>
+            <a:br>
+              <a:rPr lang="en-US" dirty="0">
+                <a:solidFill>
+                  <a:schemeClr val="bg1"/>
+                </a:solidFill>
+              </a:rPr>
+            </a:br>
+            <a:r>
+              <a:rPr lang="en-US" dirty="0">
+                <a:solidFill>
+                  <a:schemeClr val="bg1"/>
+                </a:solidFill>
+              </a:rPr>
+              <a:t>reaching 135 million units.</a:t>
+            </a:r>
+          </a:p>
+        </p:txBody>
+      </p:sp>
+      <p:pic>
+        <p:nvPicPr>
+          <p:cNvPr id="21" name="Picture 20" descr="A graph with blue and black lines&#10;&#10;Description automatically generated">
+            <a:extLst>
+              <a:ext uri="{FF2B5EF4-FFF2-40B4-BE49-F238E27FC236}">
+                <a16:creationId xmlns:a16="http://schemas.microsoft.com/office/drawing/2014/main" id="{ED03D5B1-51C2-96B1-D5C0-1BC2DBD32942}"/>
+              </a:ext>
+            </a:extLst>
+          </p:cNvPr>
+          <p:cNvPicPr>
+            <a:picLocks noChangeAspect="1"/>
+          </p:cNvPicPr>
+          <p:nvPr/>
+        </p:nvPicPr>
+        <p:blipFill>
+          <a:blip r:embed="rId4"/>
+          <a:stretch>
+            <a:fillRect/>
+          </a:stretch>
+        </p:blipFill>
+        <p:spPr>
+          <a:xfrm>
+            <a:off x="158549" y="4724309"/>
+            <a:ext cx="5479779" cy="2082812"/>
+          </a:xfrm>
+          <a:prstGeom prst="rect">
+            <a:avLst/>
+          </a:prstGeom>
+        </p:spPr>
+      </p:pic>
+      <p:sp>
+        <p:nvSpPr>
+          <p:cNvPr id="22" name="TextBox 21">
+            <a:extLst>
+              <a:ext uri="{FF2B5EF4-FFF2-40B4-BE49-F238E27FC236}">
+                <a16:creationId xmlns:a16="http://schemas.microsoft.com/office/drawing/2014/main" id="{C0115AB3-5FAA-C555-503C-6A198C9996BA}"/>
+              </a:ext>
+            </a:extLst>
+          </p:cNvPr>
+          <p:cNvSpPr txBox="1"/>
+          <p:nvPr/>
+        </p:nvSpPr>
+        <p:spPr>
+          <a:xfrm>
+            <a:off x="6107023" y="108135"/>
+            <a:ext cx="3199211" cy="369332"/>
+          </a:xfrm>
+          <a:prstGeom prst="rect">
+            <a:avLst/>
+          </a:prstGeom>
+          <a:noFill/>
+        </p:spPr>
+        <p:txBody>
+          <a:bodyPr wrap="square" rtlCol="0">
+            <a:spAutoFit/>
+          </a:bodyPr>
+          <a:lstStyle/>
+          <a:p>
+            <a:r>
+              <a:rPr lang="en-US" b="1" dirty="0">
+                <a:solidFill>
+                  <a:srgbClr val="FFFF00"/>
+                </a:solidFill>
+              </a:rPr>
+              <a:t>THE COOLING PROBLEM</a:t>
+            </a:r>
+          </a:p>
+        </p:txBody>
+      </p:sp>
+      <p:sp>
+        <p:nvSpPr>
+          <p:cNvPr id="23" name="TextBox 22">
+            <a:extLst>
+              <a:ext uri="{FF2B5EF4-FFF2-40B4-BE49-F238E27FC236}">
+                <a16:creationId xmlns:a16="http://schemas.microsoft.com/office/drawing/2014/main" id="{BEE3E7BB-88ED-83C5-F72B-6F78065AC7C6}"/>
+              </a:ext>
+            </a:extLst>
+          </p:cNvPr>
+          <p:cNvSpPr txBox="1"/>
+          <p:nvPr/>
+        </p:nvSpPr>
+        <p:spPr>
+          <a:xfrm>
+            <a:off x="6107023" y="409433"/>
+            <a:ext cx="2986775" cy="2308324"/>
+          </a:xfrm>
+          <a:prstGeom prst="rect">
+            <a:avLst/>
+          </a:prstGeom>
+          <a:noFill/>
+        </p:spPr>
+        <p:txBody>
+          <a:bodyPr wrap="square" rtlCol="0">
+            <a:spAutoFit/>
+          </a:bodyPr>
+          <a:lstStyle/>
+          <a:p>
+            <a:r>
+              <a:rPr lang="en-US" dirty="0">
+                <a:solidFill>
+                  <a:schemeClr val="bg1"/>
+                </a:solidFill>
+              </a:rPr>
+              <a:t>- Emission of greenhouse gases from ACs through refrigerant leakages since ACs use HFCs as a coolant.</a:t>
+            </a:r>
+          </a:p>
+          <a:p>
+            <a:r>
+              <a:rPr lang="en-US" dirty="0">
+                <a:solidFill>
+                  <a:schemeClr val="bg1"/>
+                </a:solidFill>
+              </a:rPr>
+              <a:t>- ACs are quite energy intensive.</a:t>
+            </a:r>
+          </a:p>
+          <a:p>
+            <a:r>
+              <a:rPr lang="en-US" dirty="0">
+                <a:solidFill>
+                  <a:schemeClr val="bg1"/>
+                </a:solidFill>
+              </a:rPr>
+              <a:t>- ACs don’t dissipate heat creating urban heat islands.</a:t>
+            </a:r>
+          </a:p>
+        </p:txBody>
+      </p:sp>
+      <p:sp>
+        <p:nvSpPr>
+          <p:cNvPr id="24" name="TextBox 23">
+            <a:extLst>
+              <a:ext uri="{FF2B5EF4-FFF2-40B4-BE49-F238E27FC236}">
+                <a16:creationId xmlns:a16="http://schemas.microsoft.com/office/drawing/2014/main" id="{45E65B9E-0EE3-F6ED-3836-EAF2D3029C46}"/>
+              </a:ext>
+            </a:extLst>
+          </p:cNvPr>
+          <p:cNvSpPr txBox="1"/>
+          <p:nvPr/>
+        </p:nvSpPr>
+        <p:spPr>
+          <a:xfrm>
+            <a:off x="5732950" y="3014618"/>
+            <a:ext cx="3199211" cy="369332"/>
+          </a:xfrm>
+          <a:prstGeom prst="rect">
+            <a:avLst/>
+          </a:prstGeom>
+          <a:noFill/>
+        </p:spPr>
+        <p:txBody>
+          <a:bodyPr wrap="square" rtlCol="0">
+            <a:spAutoFit/>
+          </a:bodyPr>
+          <a:lstStyle/>
+          <a:p>
+            <a:r>
+              <a:rPr lang="en-US" b="1" dirty="0">
+                <a:solidFill>
+                  <a:srgbClr val="FFFF00"/>
+                </a:solidFill>
+              </a:rPr>
+              <a:t>RADIATIVE COOLING</a:t>
+            </a:r>
+          </a:p>
+        </p:txBody>
+      </p:sp>
+      <p:sp>
+        <p:nvSpPr>
+          <p:cNvPr id="26" name="TextBox 25">
+            <a:extLst>
+              <a:ext uri="{FF2B5EF4-FFF2-40B4-BE49-F238E27FC236}">
+                <a16:creationId xmlns:a16="http://schemas.microsoft.com/office/drawing/2014/main" id="{FAB48A1D-77F0-CDE0-FCD9-F53021E75BAF}"/>
+              </a:ext>
+            </a:extLst>
+          </p:cNvPr>
+          <p:cNvSpPr txBox="1"/>
+          <p:nvPr/>
+        </p:nvSpPr>
+        <p:spPr>
+          <a:xfrm>
+            <a:off x="5732950" y="3370050"/>
+            <a:ext cx="2986775" cy="2862322"/>
+          </a:xfrm>
+          <a:prstGeom prst="rect">
+            <a:avLst/>
+          </a:prstGeom>
+          <a:noFill/>
+        </p:spPr>
+        <p:txBody>
+          <a:bodyPr wrap="square" rtlCol="0">
+            <a:spAutoFit/>
+          </a:bodyPr>
+          <a:lstStyle/>
+          <a:p>
+            <a:r>
+              <a:rPr lang="en-US" dirty="0">
+                <a:solidFill>
+                  <a:schemeClr val="bg1"/>
+                </a:solidFill>
+              </a:rPr>
+              <a:t>Occurs when objects emit more blackbody radiation than they absorb, resulting in a temperature reduction below the ambient level.</a:t>
+            </a:r>
+          </a:p>
+          <a:p>
+            <a:endParaRPr lang="en-US" dirty="0">
+              <a:solidFill>
+                <a:schemeClr val="bg1"/>
+              </a:solidFill>
+            </a:endParaRPr>
+          </a:p>
+          <a:p>
+            <a:r>
+              <a:rPr lang="en-US" dirty="0">
+                <a:solidFill>
+                  <a:schemeClr val="bg1"/>
+                </a:solidFill>
+              </a:rPr>
+              <a:t>Efficiently exchanges heat with the infinite cold reservoir of space without energy consumption.</a:t>
+            </a:r>
+          </a:p>
+        </p:txBody>
+      </p:sp>
+      <p:pic>
+        <p:nvPicPr>
+          <p:cNvPr id="28" name="Picture 27" descr="Diagram of the sun and the moon&#10;&#10;Description automatically generated">
+            <a:extLst>
+              <a:ext uri="{FF2B5EF4-FFF2-40B4-BE49-F238E27FC236}">
+                <a16:creationId xmlns:a16="http://schemas.microsoft.com/office/drawing/2014/main" id="{8D124D0D-E0EB-BD32-69D8-B582F974DF7F}"/>
+              </a:ext>
+            </a:extLst>
+          </p:cNvPr>
+          <p:cNvPicPr>
+            <a:picLocks noChangeAspect="1"/>
+          </p:cNvPicPr>
+          <p:nvPr/>
+        </p:nvPicPr>
+        <p:blipFill>
+          <a:blip r:embed="rId5"/>
+          <a:stretch>
+            <a:fillRect/>
+          </a:stretch>
+        </p:blipFill>
+        <p:spPr>
+          <a:xfrm>
+            <a:off x="3562096" y="2823611"/>
+            <a:ext cx="2185881" cy="1609051"/>
+          </a:xfrm>
+          <a:prstGeom prst="rect">
+            <a:avLst/>
+          </a:prstGeom>
+        </p:spPr>
+      </p:pic>
+      <p:sp>
+        <p:nvSpPr>
+          <p:cNvPr id="29" name="TextBox 28">
+            <a:extLst>
+              <a:ext uri="{FF2B5EF4-FFF2-40B4-BE49-F238E27FC236}">
+                <a16:creationId xmlns:a16="http://schemas.microsoft.com/office/drawing/2014/main" id="{AF986277-489C-24DA-8CC7-8362CFCD9798}"/>
+              </a:ext>
+            </a:extLst>
+          </p:cNvPr>
+          <p:cNvSpPr txBox="1"/>
+          <p:nvPr/>
+        </p:nvSpPr>
+        <p:spPr>
+          <a:xfrm>
+            <a:off x="8719725" y="3000718"/>
+            <a:ext cx="3199211" cy="369332"/>
+          </a:xfrm>
+          <a:prstGeom prst="rect">
+            <a:avLst/>
+          </a:prstGeom>
+          <a:noFill/>
+        </p:spPr>
+        <p:txBody>
+          <a:bodyPr wrap="square" rtlCol="0">
+            <a:spAutoFit/>
+          </a:bodyPr>
+          <a:lstStyle/>
+          <a:p>
+            <a:r>
+              <a:rPr lang="en-US" b="1" dirty="0">
+                <a:solidFill>
+                  <a:srgbClr val="FFFF00"/>
+                </a:solidFill>
+              </a:rPr>
+              <a:t>2 IMPORTANT CRITERIA</a:t>
+            </a:r>
+          </a:p>
+        </p:txBody>
+      </p:sp>
+      <p:sp>
+        <p:nvSpPr>
+          <p:cNvPr id="30" name="TextBox 29">
+            <a:extLst>
+              <a:ext uri="{FF2B5EF4-FFF2-40B4-BE49-F238E27FC236}">
+                <a16:creationId xmlns:a16="http://schemas.microsoft.com/office/drawing/2014/main" id="{054E2CA6-7136-9D36-29B1-9FDF87D4CF05}"/>
+              </a:ext>
+            </a:extLst>
+          </p:cNvPr>
+          <p:cNvSpPr txBox="1"/>
+          <p:nvPr/>
+        </p:nvSpPr>
+        <p:spPr>
+          <a:xfrm>
+            <a:off x="8719725" y="3295724"/>
+            <a:ext cx="2986775" cy="3416320"/>
+          </a:xfrm>
+          <a:prstGeom prst="rect">
+            <a:avLst/>
+          </a:prstGeom>
+          <a:noFill/>
+        </p:spPr>
+        <p:txBody>
+          <a:bodyPr wrap="square" rtlCol="0">
+            <a:spAutoFit/>
+          </a:bodyPr>
+          <a:lstStyle/>
+          <a:p>
+            <a:pPr marL="342900" indent="-342900">
+              <a:buAutoNum type="arabicPeriod"/>
+            </a:pPr>
+            <a:r>
+              <a:rPr lang="en-US" dirty="0">
+                <a:solidFill>
+                  <a:schemeClr val="bg1"/>
+                </a:solidFill>
+              </a:rPr>
+              <a:t>100% reflectance in the solar spectrum so the surface is not heated by sunlight in the daytime.</a:t>
+            </a:r>
+          </a:p>
+          <a:p>
+            <a:pPr marL="342900" indent="-342900">
+              <a:buAutoNum type="arabicPeriod"/>
+            </a:pPr>
+            <a:r>
+              <a:rPr lang="en-US" dirty="0">
+                <a:solidFill>
+                  <a:schemeClr val="bg1"/>
+                </a:solidFill>
+              </a:rPr>
+              <a:t>Emittance of 1 in the LWIR transmission window where the atmosphere is partially transparent (limited absorption by gas molecules).</a:t>
+            </a:r>
+          </a:p>
+          <a:p>
+            <a:pPr marL="342900" indent="-342900">
+              <a:buAutoNum type="arabicPeriod"/>
+            </a:pPr>
+            <a:endParaRPr lang="en-US" dirty="0">
+              <a:solidFill>
+                <a:schemeClr val="bg1"/>
+              </a:solidFill>
+            </a:endParaRPr>
+          </a:p>
+        </p:txBody>
+      </p:sp>
+      <p:pic>
+        <p:nvPicPr>
+          <p:cNvPr id="32" name="Picture 31" descr="A graph showing the length of a window&#10;&#10;Description automatically generated">
+            <a:extLst>
+              <a:ext uri="{FF2B5EF4-FFF2-40B4-BE49-F238E27FC236}">
+                <a16:creationId xmlns:a16="http://schemas.microsoft.com/office/drawing/2014/main" id="{DBB2C13F-3183-E4C7-C90D-07C953A54CDA}"/>
+              </a:ext>
+            </a:extLst>
+          </p:cNvPr>
+          <p:cNvPicPr>
+            <a:picLocks noChangeAspect="1"/>
+          </p:cNvPicPr>
+          <p:nvPr/>
+        </p:nvPicPr>
+        <p:blipFill>
+          <a:blip r:embed="rId6"/>
+          <a:stretch>
+            <a:fillRect/>
+          </a:stretch>
+        </p:blipFill>
+        <p:spPr>
+          <a:xfrm>
+            <a:off x="9012804" y="576891"/>
+            <a:ext cx="3136900" cy="1295400"/>
+          </a:xfrm>
+          <a:prstGeom prst="rect">
+            <a:avLst/>
+          </a:prstGeom>
+        </p:spPr>
+      </p:pic>
     </p:spTree>
     <p:extLst>
       <p:ext uri="{BB962C8B-B14F-4D97-AF65-F5344CB8AC3E}">
@@ -4125,6 +4632,516 @@
   <p:clrMapOvr>
     <a:masterClrMapping/>
   </p:clrMapOvr>
+  <p:timing>
+    <p:tnLst>
+      <p:par>
+        <p:cTn id="1" dur="indefinite" restart="never" nodeType="tmRoot">
+          <p:childTnLst>
+            <p:seq concurrent="1" nextAc="seek">
+              <p:cTn id="2" dur="indefinite" nodeType="mainSeq">
+                <p:childTnLst>
+                  <p:par>
+                    <p:cTn id="3" fill="hold">
+                      <p:stCondLst>
+                        <p:cond delay="indefinite"/>
+                      </p:stCondLst>
+                      <p:childTnLst>
+                        <p:par>
+                          <p:cTn id="4" fill="hold">
+                            <p:stCondLst>
+                              <p:cond delay="0"/>
+                            </p:stCondLst>
+                            <p:childTnLst>
+                              <p:par>
+                                <p:cTn id="5" presetID="1" presetClass="entr" presetSubtype="0" fill="hold" grpId="0" nodeType="clickEffect">
+                                  <p:stCondLst>
+                                    <p:cond delay="0"/>
+                                  </p:stCondLst>
+                                  <p:childTnLst>
+                                    <p:set>
+                                      <p:cBhvr>
+                                        <p:cTn id="6" dur="1" fill="hold">
+                                          <p:stCondLst>
+                                            <p:cond delay="0"/>
+                                          </p:stCondLst>
+                                        </p:cTn>
+                                        <p:tgtEl>
+                                          <p:spTgt spid="12"/>
+                                        </p:tgtEl>
+                                        <p:attrNameLst>
+                                          <p:attrName>style.visibility</p:attrName>
+                                        </p:attrNameLst>
+                                      </p:cBhvr>
+                                      <p:to>
+                                        <p:strVal val="visible"/>
+                                      </p:to>
+                                    </p:set>
+                                  </p:childTnLst>
+                                </p:cTn>
+                              </p:par>
+                              <p:par>
+                                <p:cTn id="7" presetID="1" presetClass="entr" presetSubtype="0" fill="hold" grpId="0" nodeType="withEffect">
+                                  <p:stCondLst>
+                                    <p:cond delay="0"/>
+                                  </p:stCondLst>
+                                  <p:childTnLst>
+                                    <p:set>
+                                      <p:cBhvr>
+                                        <p:cTn id="8" dur="1" fill="hold">
+                                          <p:stCondLst>
+                                            <p:cond delay="0"/>
+                                          </p:stCondLst>
+                                        </p:cTn>
+                                        <p:tgtEl>
+                                          <p:spTgt spid="7"/>
+                                        </p:tgtEl>
+                                        <p:attrNameLst>
+                                          <p:attrName>style.visibility</p:attrName>
+                                        </p:attrNameLst>
+                                      </p:cBhvr>
+                                      <p:to>
+                                        <p:strVal val="visible"/>
+                                      </p:to>
+                                    </p:set>
+                                  </p:childTnLst>
+                                </p:cTn>
+                              </p:par>
+                              <p:par>
+                                <p:cTn id="9" presetID="1" presetClass="entr" presetSubtype="0" fill="hold" nodeType="withEffect">
+                                  <p:stCondLst>
+                                    <p:cond delay="0"/>
+                                  </p:stCondLst>
+                                  <p:childTnLst>
+                                    <p:set>
+                                      <p:cBhvr>
+                                        <p:cTn id="10" dur="1" fill="hold">
+                                          <p:stCondLst>
+                                            <p:cond delay="0"/>
+                                          </p:stCondLst>
+                                        </p:cTn>
+                                        <p:tgtEl>
+                                          <p:spTgt spid="10"/>
+                                        </p:tgtEl>
+                                        <p:attrNameLst>
+                                          <p:attrName>style.visibility</p:attrName>
+                                        </p:attrNameLst>
+                                      </p:cBhvr>
+                                      <p:to>
+                                        <p:strVal val="visible"/>
+                                      </p:to>
+                                    </p:set>
+                                  </p:childTnLst>
+                                </p:cTn>
+                              </p:par>
+                            </p:childTnLst>
+                          </p:cTn>
+                        </p:par>
+                      </p:childTnLst>
+                    </p:cTn>
+                  </p:par>
+                  <p:par>
+                    <p:cTn id="11" fill="hold">
+                      <p:stCondLst>
+                        <p:cond delay="indefinite"/>
+                      </p:stCondLst>
+                      <p:childTnLst>
+                        <p:par>
+                          <p:cTn id="12" fill="hold">
+                            <p:stCondLst>
+                              <p:cond delay="0"/>
+                            </p:stCondLst>
+                            <p:childTnLst>
+                              <p:par>
+                                <p:cTn id="13" presetID="1" presetClass="entr" presetSubtype="0" fill="hold" grpId="0" nodeType="clickEffect">
+                                  <p:stCondLst>
+                                    <p:cond delay="0"/>
+                                  </p:stCondLst>
+                                  <p:childTnLst>
+                                    <p:set>
+                                      <p:cBhvr>
+                                        <p:cTn id="14" dur="1" fill="hold">
+                                          <p:stCondLst>
+                                            <p:cond delay="0"/>
+                                          </p:stCondLst>
+                                        </p:cTn>
+                                        <p:tgtEl>
+                                          <p:spTgt spid="6"/>
+                                        </p:tgtEl>
+                                        <p:attrNameLst>
+                                          <p:attrName>style.visibility</p:attrName>
+                                        </p:attrNameLst>
+                                      </p:cBhvr>
+                                      <p:to>
+                                        <p:strVal val="visible"/>
+                                      </p:to>
+                                    </p:set>
+                                  </p:childTnLst>
+                                </p:cTn>
+                              </p:par>
+                              <p:par>
+                                <p:cTn id="15" presetID="1" presetClass="entr" presetSubtype="0" fill="hold" grpId="0" nodeType="withEffect">
+                                  <p:stCondLst>
+                                    <p:cond delay="0"/>
+                                  </p:stCondLst>
+                                  <p:childTnLst>
+                                    <p:set>
+                                      <p:cBhvr>
+                                        <p:cTn id="16" dur="1" fill="hold">
+                                          <p:stCondLst>
+                                            <p:cond delay="0"/>
+                                          </p:stCondLst>
+                                        </p:cTn>
+                                        <p:tgtEl>
+                                          <p:spTgt spid="14"/>
+                                        </p:tgtEl>
+                                        <p:attrNameLst>
+                                          <p:attrName>style.visibility</p:attrName>
+                                        </p:attrNameLst>
+                                      </p:cBhvr>
+                                      <p:to>
+                                        <p:strVal val="visible"/>
+                                      </p:to>
+                                    </p:set>
+                                  </p:childTnLst>
+                                </p:cTn>
+                              </p:par>
+                              <p:par>
+                                <p:cTn id="17" presetID="1" presetClass="entr" presetSubtype="0" fill="hold" nodeType="withEffect">
+                                  <p:stCondLst>
+                                    <p:cond delay="0"/>
+                                  </p:stCondLst>
+                                  <p:childTnLst>
+                                    <p:set>
+                                      <p:cBhvr>
+                                        <p:cTn id="18" dur="1" fill="hold">
+                                          <p:stCondLst>
+                                            <p:cond delay="0"/>
+                                          </p:stCondLst>
+                                        </p:cTn>
+                                        <p:tgtEl>
+                                          <p:spTgt spid="21"/>
+                                        </p:tgtEl>
+                                        <p:attrNameLst>
+                                          <p:attrName>style.visibility</p:attrName>
+                                        </p:attrNameLst>
+                                      </p:cBhvr>
+                                      <p:to>
+                                        <p:strVal val="visible"/>
+                                      </p:to>
+                                    </p:set>
+                                  </p:childTnLst>
+                                </p:cTn>
+                              </p:par>
+                            </p:childTnLst>
+                          </p:cTn>
+                        </p:par>
+                      </p:childTnLst>
+                    </p:cTn>
+                  </p:par>
+                  <p:par>
+                    <p:cTn id="19" fill="hold">
+                      <p:stCondLst>
+                        <p:cond delay="indefinite"/>
+                      </p:stCondLst>
+                      <p:childTnLst>
+                        <p:par>
+                          <p:cTn id="20" fill="hold">
+                            <p:stCondLst>
+                              <p:cond delay="0"/>
+                            </p:stCondLst>
+                            <p:childTnLst>
+                              <p:par>
+                                <p:cTn id="21" presetID="1" presetClass="entr" presetSubtype="0" fill="hold" grpId="0" nodeType="clickEffect">
+                                  <p:stCondLst>
+                                    <p:cond delay="0"/>
+                                  </p:stCondLst>
+                                  <p:childTnLst>
+                                    <p:set>
+                                      <p:cBhvr>
+                                        <p:cTn id="22" dur="1" fill="hold">
+                                          <p:stCondLst>
+                                            <p:cond delay="0"/>
+                                          </p:stCondLst>
+                                        </p:cTn>
+                                        <p:tgtEl>
+                                          <p:spTgt spid="22"/>
+                                        </p:tgtEl>
+                                        <p:attrNameLst>
+                                          <p:attrName>style.visibility</p:attrName>
+                                        </p:attrNameLst>
+                                      </p:cBhvr>
+                                      <p:to>
+                                        <p:strVal val="visible"/>
+                                      </p:to>
+                                    </p:set>
+                                  </p:childTnLst>
+                                </p:cTn>
+                              </p:par>
+                              <p:par>
+                                <p:cTn id="23" presetID="1" presetClass="entr" presetSubtype="0" fill="hold" grpId="0" nodeType="withEffect">
+                                  <p:stCondLst>
+                                    <p:cond delay="0"/>
+                                  </p:stCondLst>
+                                  <p:childTnLst>
+                                    <p:set>
+                                      <p:cBhvr>
+                                        <p:cTn id="24" dur="1" fill="hold">
+                                          <p:stCondLst>
+                                            <p:cond delay="0"/>
+                                          </p:stCondLst>
+                                        </p:cTn>
+                                        <p:tgtEl>
+                                          <p:spTgt spid="23"/>
+                                        </p:tgtEl>
+                                        <p:attrNameLst>
+                                          <p:attrName>style.visibility</p:attrName>
+                                        </p:attrNameLst>
+                                      </p:cBhvr>
+                                      <p:to>
+                                        <p:strVal val="visible"/>
+                                      </p:to>
+                                    </p:set>
+                                  </p:childTnLst>
+                                </p:cTn>
+                              </p:par>
+                            </p:childTnLst>
+                          </p:cTn>
+                        </p:par>
+                      </p:childTnLst>
+                    </p:cTn>
+                  </p:par>
+                  <p:par>
+                    <p:cTn id="25" fill="hold">
+                      <p:stCondLst>
+                        <p:cond delay="indefinite"/>
+                      </p:stCondLst>
+                      <p:childTnLst>
+                        <p:par>
+                          <p:cTn id="26" fill="hold">
+                            <p:stCondLst>
+                              <p:cond delay="0"/>
+                            </p:stCondLst>
+                            <p:childTnLst>
+                              <p:par>
+                                <p:cTn id="27" presetID="1" presetClass="entr" presetSubtype="0" fill="hold" grpId="0" nodeType="clickEffect">
+                                  <p:stCondLst>
+                                    <p:cond delay="0"/>
+                                  </p:stCondLst>
+                                  <p:childTnLst>
+                                    <p:set>
+                                      <p:cBhvr>
+                                        <p:cTn id="28" dur="1" fill="hold">
+                                          <p:stCondLst>
+                                            <p:cond delay="0"/>
+                                          </p:stCondLst>
+                                        </p:cTn>
+                                        <p:tgtEl>
+                                          <p:spTgt spid="26"/>
+                                        </p:tgtEl>
+                                        <p:attrNameLst>
+                                          <p:attrName>style.visibility</p:attrName>
+                                        </p:attrNameLst>
+                                      </p:cBhvr>
+                                      <p:to>
+                                        <p:strVal val="visible"/>
+                                      </p:to>
+                                    </p:set>
+                                  </p:childTnLst>
+                                </p:cTn>
+                              </p:par>
+                              <p:par>
+                                <p:cTn id="29" presetID="1" presetClass="entr" presetSubtype="0" fill="hold" grpId="0" nodeType="withEffect">
+                                  <p:stCondLst>
+                                    <p:cond delay="0"/>
+                                  </p:stCondLst>
+                                  <p:childTnLst>
+                                    <p:set>
+                                      <p:cBhvr>
+                                        <p:cTn id="30" dur="1" fill="hold">
+                                          <p:stCondLst>
+                                            <p:cond delay="0"/>
+                                          </p:stCondLst>
+                                        </p:cTn>
+                                        <p:tgtEl>
+                                          <p:spTgt spid="24"/>
+                                        </p:tgtEl>
+                                        <p:attrNameLst>
+                                          <p:attrName>style.visibility</p:attrName>
+                                        </p:attrNameLst>
+                                      </p:cBhvr>
+                                      <p:to>
+                                        <p:strVal val="visible"/>
+                                      </p:to>
+                                    </p:set>
+                                  </p:childTnLst>
+                                </p:cTn>
+                              </p:par>
+                              <p:par>
+                                <p:cTn id="31" presetID="1" presetClass="entr" presetSubtype="0" fill="hold" nodeType="withEffect">
+                                  <p:stCondLst>
+                                    <p:cond delay="0"/>
+                                  </p:stCondLst>
+                                  <p:childTnLst>
+                                    <p:set>
+                                      <p:cBhvr>
+                                        <p:cTn id="32" dur="1" fill="hold">
+                                          <p:stCondLst>
+                                            <p:cond delay="0"/>
+                                          </p:stCondLst>
+                                        </p:cTn>
+                                        <p:tgtEl>
+                                          <p:spTgt spid="28"/>
+                                        </p:tgtEl>
+                                        <p:attrNameLst>
+                                          <p:attrName>style.visibility</p:attrName>
+                                        </p:attrNameLst>
+                                      </p:cBhvr>
+                                      <p:to>
+                                        <p:strVal val="visible"/>
+                                      </p:to>
+                                    </p:set>
+                                  </p:childTnLst>
+                                </p:cTn>
+                              </p:par>
+                            </p:childTnLst>
+                          </p:cTn>
+                        </p:par>
+                      </p:childTnLst>
+                    </p:cTn>
+                  </p:par>
+                  <p:par>
+                    <p:cTn id="33" fill="hold">
+                      <p:stCondLst>
+                        <p:cond delay="indefinite"/>
+                      </p:stCondLst>
+                      <p:childTnLst>
+                        <p:par>
+                          <p:cTn id="34" fill="hold">
+                            <p:stCondLst>
+                              <p:cond delay="0"/>
+                            </p:stCondLst>
+                            <p:childTnLst>
+                              <p:par>
+                                <p:cTn id="35" presetID="1" presetClass="entr" presetSubtype="0" fill="hold" nodeType="clickEffect">
+                                  <p:stCondLst>
+                                    <p:cond delay="0"/>
+                                  </p:stCondLst>
+                                  <p:childTnLst>
+                                    <p:set>
+                                      <p:cBhvr>
+                                        <p:cTn id="36" dur="1" fill="hold">
+                                          <p:stCondLst>
+                                            <p:cond delay="0"/>
+                                          </p:stCondLst>
+                                        </p:cTn>
+                                        <p:tgtEl>
+                                          <p:spTgt spid="32"/>
+                                        </p:tgtEl>
+                                        <p:attrNameLst>
+                                          <p:attrName>style.visibility</p:attrName>
+                                        </p:attrNameLst>
+                                      </p:cBhvr>
+                                      <p:to>
+                                        <p:strVal val="visible"/>
+                                      </p:to>
+                                    </p:set>
+                                  </p:childTnLst>
+                                </p:cTn>
+                              </p:par>
+                              <p:par>
+                                <p:cTn id="37" presetID="1" presetClass="entr" presetSubtype="0" fill="hold" grpId="0" nodeType="withEffect">
+                                  <p:stCondLst>
+                                    <p:cond delay="0"/>
+                                  </p:stCondLst>
+                                  <p:childTnLst>
+                                    <p:set>
+                                      <p:cBhvr>
+                                        <p:cTn id="38" dur="1" fill="hold">
+                                          <p:stCondLst>
+                                            <p:cond delay="0"/>
+                                          </p:stCondLst>
+                                        </p:cTn>
+                                        <p:tgtEl>
+                                          <p:spTgt spid="29"/>
+                                        </p:tgtEl>
+                                        <p:attrNameLst>
+                                          <p:attrName>style.visibility</p:attrName>
+                                        </p:attrNameLst>
+                                      </p:cBhvr>
+                                      <p:to>
+                                        <p:strVal val="visible"/>
+                                      </p:to>
+                                    </p:set>
+                                  </p:childTnLst>
+                                </p:cTn>
+                              </p:par>
+                              <p:par>
+                                <p:cTn id="39" presetID="1" presetClass="entr" presetSubtype="0" fill="hold" grpId="0" nodeType="withEffect">
+                                  <p:stCondLst>
+                                    <p:cond delay="0"/>
+                                  </p:stCondLst>
+                                  <p:childTnLst>
+                                    <p:set>
+                                      <p:cBhvr>
+                                        <p:cTn id="40" dur="1" fill="hold">
+                                          <p:stCondLst>
+                                            <p:cond delay="0"/>
+                                          </p:stCondLst>
+                                        </p:cTn>
+                                        <p:tgtEl>
+                                          <p:spTgt spid="30"/>
+                                        </p:tgtEl>
+                                        <p:attrNameLst>
+                                          <p:attrName>style.visibility</p:attrName>
+                                        </p:attrNameLst>
+                                      </p:cBhvr>
+                                      <p:to>
+                                        <p:strVal val="visible"/>
+                                      </p:to>
+                                    </p:set>
+                                  </p:childTnLst>
+                                </p:cTn>
+                              </p:par>
+                            </p:childTnLst>
+                          </p:cTn>
+                        </p:par>
+                      </p:childTnLst>
+                    </p:cTn>
+                  </p:par>
+                </p:childTnLst>
+              </p:cTn>
+              <p:prevCondLst>
+                <p:cond evt="onPrev" delay="0">
+                  <p:tgtEl>
+                    <p:sldTgt/>
+                  </p:tgtEl>
+                </p:cond>
+              </p:prevCondLst>
+              <p:nextCondLst>
+                <p:cond evt="onNext" delay="0">
+                  <p:tgtEl>
+                    <p:sldTgt/>
+                  </p:tgtEl>
+                </p:cond>
+              </p:nextCondLst>
+            </p:seq>
+          </p:childTnLst>
+        </p:cTn>
+      </p:par>
+    </p:tnLst>
+    <p:bldLst>
+      <p:bldP spid="6" grpId="0"/>
+      <p:bldP spid="7" grpId="0"/>
+      <p:bldP spid="12" grpId="0"/>
+      <p:bldP spid="14" grpId="0"/>
+      <p:bldP spid="22" grpId="0"/>
+      <p:bldP spid="23" grpId="0"/>
+      <p:bldP spid="24" grpId="0"/>
+      <p:bldP spid="26" grpId="0"/>
+      <p:bldP spid="29" grpId="0"/>
+      <p:bldP spid="30" grpId="0"/>
+    </p:bldLst>
+  </p:timing>
 </p:sld>
 </file>
 

</xml_diff>

<commit_message>
Arrange figures into respective chapter folders
</commit_message>
<xml_diff>
--- a/Presentations/Senior Seminar 'Introduction' Chapter Presentation.pptx
+++ b/Presentations/Senior Seminar 'Introduction' Chapter Presentation.pptx
@@ -264,7 +264,7 @@
           <a:p>
             <a:fld id="{8C1E1FAD-7351-4908-963A-08EA8E4AB7A0}" type="datetimeFigureOut">
               <a:rPr lang="en-US" smtClean="0"/>
-              <a:t>11/13/23</a:t>
+              <a:t>3/6/24</a:t>
             </a:fld>
             <a:endParaRPr lang="en-US"/>
           </a:p>
@@ -462,7 +462,7 @@
           <a:p>
             <a:fld id="{8C1E1FAD-7351-4908-963A-08EA8E4AB7A0}" type="datetimeFigureOut">
               <a:rPr lang="en-US" smtClean="0"/>
-              <a:t>11/13/23</a:t>
+              <a:t>3/6/24</a:t>
             </a:fld>
             <a:endParaRPr lang="en-US"/>
           </a:p>
@@ -670,7 +670,7 @@
           <a:p>
             <a:fld id="{8C1E1FAD-7351-4908-963A-08EA8E4AB7A0}" type="datetimeFigureOut">
               <a:rPr lang="en-US" smtClean="0"/>
-              <a:t>11/13/23</a:t>
+              <a:t>3/6/24</a:t>
             </a:fld>
             <a:endParaRPr lang="en-US"/>
           </a:p>
@@ -899,7 +899,7 @@
           <a:p>
             <a:fld id="{8C1E1FAD-7351-4908-963A-08EA8E4AB7A0}" type="datetimeFigureOut">
               <a:rPr lang="en-US" smtClean="0"/>
-              <a:t>11/13/23</a:t>
+              <a:t>3/6/24</a:t>
             </a:fld>
             <a:endParaRPr lang="en-US"/>
           </a:p>
@@ -1176,7 +1176,7 @@
           <a:p>
             <a:fld id="{8C1E1FAD-7351-4908-963A-08EA8E4AB7A0}" type="datetimeFigureOut">
               <a:rPr lang="en-US" smtClean="0"/>
-              <a:t>11/13/23</a:t>
+              <a:t>3/6/24</a:t>
             </a:fld>
             <a:endParaRPr lang="en-US"/>
           </a:p>
@@ -1441,7 +1441,7 @@
           <a:p>
             <a:fld id="{8C1E1FAD-7351-4908-963A-08EA8E4AB7A0}" type="datetimeFigureOut">
               <a:rPr lang="en-US" smtClean="0"/>
-              <a:t>11/13/23</a:t>
+              <a:t>3/6/24</a:t>
             </a:fld>
             <a:endParaRPr lang="en-US"/>
           </a:p>
@@ -1857,7 +1857,7 @@
           <a:p>
             <a:fld id="{8C1E1FAD-7351-4908-963A-08EA8E4AB7A0}" type="datetimeFigureOut">
               <a:rPr lang="en-US" smtClean="0"/>
-              <a:t>11/13/23</a:t>
+              <a:t>3/6/24</a:t>
             </a:fld>
             <a:endParaRPr lang="en-US"/>
           </a:p>
@@ -2003,7 +2003,7 @@
           <a:p>
             <a:fld id="{8C1E1FAD-7351-4908-963A-08EA8E4AB7A0}" type="datetimeFigureOut">
               <a:rPr lang="en-US" smtClean="0"/>
-              <a:t>11/13/23</a:t>
+              <a:t>3/6/24</a:t>
             </a:fld>
             <a:endParaRPr lang="en-US"/>
           </a:p>
@@ -2116,7 +2116,7 @@
           <a:p>
             <a:fld id="{8C1E1FAD-7351-4908-963A-08EA8E4AB7A0}" type="datetimeFigureOut">
               <a:rPr lang="en-US" smtClean="0"/>
-              <a:t>11/13/23</a:t>
+              <a:t>3/6/24</a:t>
             </a:fld>
             <a:endParaRPr lang="en-US"/>
           </a:p>
@@ -2431,7 +2431,7 @@
           <a:p>
             <a:fld id="{8C1E1FAD-7351-4908-963A-08EA8E4AB7A0}" type="datetimeFigureOut">
               <a:rPr lang="en-US" smtClean="0"/>
-              <a:t>11/13/23</a:t>
+              <a:t>3/6/24</a:t>
             </a:fld>
             <a:endParaRPr lang="en-US"/>
           </a:p>
@@ -2724,7 +2724,7 @@
           <a:p>
             <a:fld id="{8C1E1FAD-7351-4908-963A-08EA8E4AB7A0}" type="datetimeFigureOut">
               <a:rPr lang="en-US" smtClean="0"/>
-              <a:t>11/13/23</a:t>
+              <a:t>3/6/24</a:t>
             </a:fld>
             <a:endParaRPr lang="en-US"/>
           </a:p>
@@ -2959,7 +2959,7 @@
           <a:p>
             <a:fld id="{8C1E1FAD-7351-4908-963A-08EA8E4AB7A0}" type="datetimeFigureOut">
               <a:rPr lang="en-US" smtClean="0"/>
-              <a:t>11/13/23</a:t>
+              <a:t>3/6/24</a:t>
             </a:fld>
             <a:endParaRPr lang="en-US"/>
           </a:p>

</xml_diff>